<commit_message>
Paper reviewed and presentation updated.
</commit_message>
<xml_diff>
--- a/Documentation/Group Presentation.pptx
+++ b/Documentation/Group Presentation.pptx
@@ -114,6 +114,11 @@
       </a:defRPr>
     </a:lvl9pPr>
   </p:defaultTextStyle>
+  <p:extLst>
+    <p:ext uri="{EFAFB233-063F-42B5-8137-9DF3F51BA10A}">
+      <p15:sldGuideLst xmlns:p15="http://schemas.microsoft.com/office/powerpoint/2012/main"/>
+    </p:ext>
+  </p:extLst>
 </p:presentation>
 </file>
 
@@ -5840,7 +5845,7 @@
               <a:buChar char=""/>
             </a:pPr>
             <a:r>
-              <a:rPr lang="en-US" sz="2000" b="0" strike="noStrike" spc="-1">
+              <a:rPr lang="en-US" sz="2000" b="0" strike="noStrike" spc="-1" dirty="0">
                 <a:solidFill>
                   <a:srgbClr val="FFFFFF"/>
                 </a:solidFill>
@@ -5867,7 +5872,7 @@
               <a:buChar char=""/>
             </a:pPr>
             <a:r>
-              <a:rPr lang="en-US" sz="1800" b="0" strike="noStrike" spc="-1">
+              <a:rPr lang="en-US" sz="1800" b="0" strike="noStrike" spc="-1" dirty="0">
                 <a:solidFill>
                   <a:srgbClr val="FFFFFF"/>
                 </a:solidFill>
@@ -5880,7 +5885,7 @@
               </a:rPr>
               <a:t>Complete data for the years 2006-2014 was found </a:t>
             </a:r>
-            <a:endParaRPr lang="en-US" sz="1600" b="0" strike="noStrike" spc="-1">
+            <a:endParaRPr lang="en-US" sz="1600" b="0" strike="noStrike" spc="-1" dirty="0">
               <a:solidFill>
                 <a:srgbClr val="FFFFFF"/>
               </a:solidFill>
@@ -5905,7 +5910,7 @@
               <a:buChar char=""/>
             </a:pPr>
             <a:r>
-              <a:rPr lang="en-US" sz="2000" b="0" strike="noStrike" spc="-1">
+              <a:rPr lang="en-US" sz="2000" b="0" strike="noStrike" spc="-1" dirty="0">
                 <a:solidFill>
                   <a:srgbClr val="FFFFFF"/>
                 </a:solidFill>
@@ -5932,7 +5937,7 @@
               <a:buChar char=""/>
             </a:pPr>
             <a:r>
-              <a:rPr lang="en-US" sz="1800" b="0" strike="noStrike" spc="-1">
+              <a:rPr lang="en-US" sz="1800" b="0" strike="noStrike" spc="-1" dirty="0">
                 <a:solidFill>
                   <a:srgbClr val="FFFFFF"/>
                 </a:solidFill>
@@ -5945,7 +5950,7 @@
               </a:rPr>
               <a:t>College Football Stats</a:t>
             </a:r>
-            <a:endParaRPr lang="en-US" sz="1600" b="0" strike="noStrike" spc="-1">
+            <a:endParaRPr lang="en-US" sz="1600" b="0" strike="noStrike" spc="-1" dirty="0">
               <a:solidFill>
                 <a:srgbClr val="FFFFFF"/>
               </a:solidFill>
@@ -5970,7 +5975,7 @@
               <a:buChar char=""/>
             </a:pPr>
             <a:r>
-              <a:rPr lang="en-US" sz="1600" b="0" strike="noStrike" spc="-1">
+              <a:rPr lang="en-US" sz="1600" b="0" strike="noStrike" spc="-1" dirty="0">
                 <a:solidFill>
                   <a:srgbClr val="FFFFFF"/>
                 </a:solidFill>
@@ -5981,9 +5986,50 @@
                 </a:uFill>
                 <a:latin typeface="Century Gothic"/>
               </a:rPr>
-              <a:t>Individual player stats</a:t>
+              <a:t>Individual player </a:t>
             </a:r>
-            <a:endParaRPr lang="en-US" sz="1400" b="0" strike="noStrike" spc="-1">
+            <a:r>
+              <a:rPr lang="en-US" sz="1600" b="0" strike="noStrike" spc="-1" dirty="0" smtClean="0">
+                <a:solidFill>
+                  <a:srgbClr val="FFFFFF"/>
+                </a:solidFill>
+                <a:uFill>
+                  <a:solidFill>
+                    <a:srgbClr val="FFFFFF"/>
+                  </a:solidFill>
+                </a:uFill>
+                <a:latin typeface="Century Gothic"/>
+              </a:rPr>
+              <a:t>stats</a:t>
+            </a:r>
+          </a:p>
+          <a:p>
+            <a:pPr marL="1143000" lvl="2" indent="-228240">
+              <a:lnSpc>
+                <a:spcPct val="100000"/>
+              </a:lnSpc>
+              <a:buClr>
+                <a:srgbClr val="8AD0D6"/>
+              </a:buClr>
+              <a:buSzPct val="80000"/>
+              <a:buFont typeface="Wingdings 3" charset="2"/>
+              <a:buChar char=""/>
+            </a:pPr>
+            <a:r>
+              <a:rPr lang="en-US" sz="1600" spc="-1" dirty="0" smtClean="0">
+                <a:solidFill>
+                  <a:srgbClr val="FFFFFF"/>
+                </a:solidFill>
+                <a:uFill>
+                  <a:solidFill>
+                    <a:srgbClr val="FFFFFF"/>
+                  </a:solidFill>
+                </a:uFill>
+                <a:latin typeface="Century Gothic"/>
+              </a:rPr>
+              <a:t>Excel files ready for download</a:t>
+            </a:r>
+            <a:endParaRPr lang="en-US" sz="1400" b="0" strike="noStrike" spc="-1" dirty="0">
               <a:solidFill>
                 <a:srgbClr val="FFFFFF"/>
               </a:solidFill>
@@ -6008,7 +6054,7 @@
               <a:buChar char=""/>
             </a:pPr>
             <a:r>
-              <a:rPr lang="en-US" sz="1800" b="0" strike="noStrike" spc="-1">
+              <a:rPr lang="en-US" sz="1800" b="0" strike="noStrike" spc="-1" dirty="0">
                 <a:solidFill>
                   <a:srgbClr val="FFFFFF"/>
                 </a:solidFill>
@@ -6021,7 +6067,7 @@
               </a:rPr>
               <a:t>ESPN College Football High School Recruits</a:t>
             </a:r>
-            <a:endParaRPr lang="en-US" sz="1600" b="0" strike="noStrike" spc="-1">
+            <a:endParaRPr lang="en-US" sz="1600" b="0" strike="noStrike" spc="-1" dirty="0">
               <a:solidFill>
                 <a:srgbClr val="FFFFFF"/>
               </a:solidFill>
@@ -6046,7 +6092,7 @@
               <a:buChar char=""/>
             </a:pPr>
             <a:r>
-              <a:rPr lang="en-US" sz="1600" b="0" strike="noStrike" spc="-1">
+              <a:rPr lang="en-US" sz="1600" b="0" strike="noStrike" spc="-1" dirty="0">
                 <a:solidFill>
                   <a:srgbClr val="FFFFFF"/>
                 </a:solidFill>
@@ -6057,9 +6103,50 @@
                 </a:uFill>
                 <a:latin typeface="Century Gothic"/>
               </a:rPr>
-              <a:t>Individual high school grades</a:t>
+              <a:t>Individual high school </a:t>
             </a:r>
-            <a:endParaRPr lang="en-US" sz="1400" b="0" strike="noStrike" spc="-1">
+            <a:r>
+              <a:rPr lang="en-US" sz="1600" b="0" strike="noStrike" spc="-1" dirty="0" smtClean="0">
+                <a:solidFill>
+                  <a:srgbClr val="FFFFFF"/>
+                </a:solidFill>
+                <a:uFill>
+                  <a:solidFill>
+                    <a:srgbClr val="FFFFFF"/>
+                  </a:solidFill>
+                </a:uFill>
+                <a:latin typeface="Century Gothic"/>
+              </a:rPr>
+              <a:t>grades</a:t>
+            </a:r>
+          </a:p>
+          <a:p>
+            <a:pPr marL="1143000" lvl="2" indent="-228240">
+              <a:lnSpc>
+                <a:spcPct val="100000"/>
+              </a:lnSpc>
+              <a:buClr>
+                <a:srgbClr val="8AD0D6"/>
+              </a:buClr>
+              <a:buSzPct val="80000"/>
+              <a:buFont typeface="Wingdings 3" charset="2"/>
+              <a:buChar char=""/>
+            </a:pPr>
+            <a:r>
+              <a:rPr lang="en-US" sz="1600" spc="-1" dirty="0" smtClean="0">
+                <a:solidFill>
+                  <a:srgbClr val="FFFFFF"/>
+                </a:solidFill>
+                <a:uFill>
+                  <a:solidFill>
+                    <a:srgbClr val="FFFFFF"/>
+                  </a:solidFill>
+                </a:uFill>
+                <a:latin typeface="Century Gothic"/>
+              </a:rPr>
+              <a:t>HTML Tables</a:t>
+            </a:r>
+            <a:endParaRPr lang="en-US" sz="1400" b="0" strike="noStrike" spc="-1" dirty="0">
               <a:solidFill>
                 <a:srgbClr val="FFFFFF"/>
               </a:solidFill>
@@ -6084,7 +6171,7 @@
               <a:buChar char=""/>
             </a:pPr>
             <a:r>
-              <a:rPr lang="en-US" sz="2000" b="0" strike="noStrike" spc="-1">
+              <a:rPr lang="en-US" sz="2000" b="0" strike="noStrike" spc="-1" dirty="0">
                 <a:solidFill>
                   <a:srgbClr val="FFFFFF"/>
                 </a:solidFill>
@@ -6111,7 +6198,7 @@
               <a:buChar char=""/>
             </a:pPr>
             <a:r>
-              <a:rPr lang="en-US" sz="1800" b="0" strike="noStrike" spc="-1">
+              <a:rPr lang="en-US" sz="1800" b="0" strike="noStrike" spc="-1" dirty="0">
                 <a:solidFill>
                   <a:srgbClr val="FFFFFF"/>
                 </a:solidFill>
@@ -6124,7 +6211,7 @@
               </a:rPr>
               <a:t>Multiple CSVs with relevant information generated per year</a:t>
             </a:r>
-            <a:endParaRPr lang="en-US" sz="1600" b="0" strike="noStrike" spc="-1">
+            <a:endParaRPr lang="en-US" sz="1600" b="0" strike="noStrike" spc="-1" dirty="0">
               <a:solidFill>
                 <a:srgbClr val="FFFFFF"/>
               </a:solidFill>

</xml_diff>